<commit_message>
Update instructions in UserGuide.md, diagrams in DevelopersGuide.md
</commit_message>
<xml_diff>
--- a/docs/diagrams/HighLevelSequenceDiagrams.pptx
+++ b/docs/diagrams/HighLevelSequenceDiagrams.pptx
@@ -107,6 +107,22 @@
       </a:defRPr>
     </a:lvl9pPr>
   </p:defaultTextStyle>
+  <p:extLst>
+    <p:ext uri="{EFAFB233-063F-42B5-8137-9DF3F51BA10A}">
+      <p15:sldGuideLst xmlns:p15="http://schemas.microsoft.com/office/powerpoint/2012/main">
+        <p15:guide id="1" orient="horz" pos="1488">
+          <p15:clr>
+            <a:srgbClr val="A4A3A4"/>
+          </p15:clr>
+        </p15:guide>
+        <p15:guide id="2" pos="2880">
+          <p15:clr>
+            <a:srgbClr val="A4A3A4"/>
+          </p15:clr>
+        </p15:guide>
+      </p15:sldGuideLst>
+    </p:ext>
+  </p:extLst>
 </p:presentation>
 </file>
 
@@ -192,7 +208,7 @@
           <a:p>
             <a:fld id="{F5CC4B3F-88C1-4FFA-B1B6-F41C21DC6924}" type="datetimeFigureOut">
               <a:rPr lang="en-US" smtClean="0"/>
-              <a:t>10/16/2016</a:t>
+              <a:t>4/8/17</a:t>
             </a:fld>
             <a:endParaRPr lang="en-US"/>
           </a:p>
@@ -641,7 +657,7 @@
           <a:p>
             <a:fld id="{78C97017-6FC3-485B-9764-EAC9E56C1D49}" type="datetimeFigureOut">
               <a:rPr lang="en-US" smtClean="0"/>
-              <a:t>10/16/2016</a:t>
+              <a:t>4/8/17</a:t>
             </a:fld>
             <a:endParaRPr lang="en-US"/>
           </a:p>
@@ -811,7 +827,7 @@
           <a:p>
             <a:fld id="{78C97017-6FC3-485B-9764-EAC9E56C1D49}" type="datetimeFigureOut">
               <a:rPr lang="en-US" smtClean="0"/>
-              <a:t>10/16/2016</a:t>
+              <a:t>4/8/17</a:t>
             </a:fld>
             <a:endParaRPr lang="en-US"/>
           </a:p>
@@ -991,7 +1007,7 @@
           <a:p>
             <a:fld id="{78C97017-6FC3-485B-9764-EAC9E56C1D49}" type="datetimeFigureOut">
               <a:rPr lang="en-US" smtClean="0"/>
-              <a:t>10/16/2016</a:t>
+              <a:t>4/8/17</a:t>
             </a:fld>
             <a:endParaRPr lang="en-US"/>
           </a:p>
@@ -1161,7 +1177,7 @@
           <a:p>
             <a:fld id="{78C97017-6FC3-485B-9764-EAC9E56C1D49}" type="datetimeFigureOut">
               <a:rPr lang="en-US" smtClean="0"/>
-              <a:t>10/16/2016</a:t>
+              <a:t>4/8/17</a:t>
             </a:fld>
             <a:endParaRPr lang="en-US"/>
           </a:p>
@@ -1407,7 +1423,7 @@
           <a:p>
             <a:fld id="{78C97017-6FC3-485B-9764-EAC9E56C1D49}" type="datetimeFigureOut">
               <a:rPr lang="en-US" smtClean="0"/>
-              <a:t>10/16/2016</a:t>
+              <a:t>4/8/17</a:t>
             </a:fld>
             <a:endParaRPr lang="en-US"/>
           </a:p>
@@ -1695,7 +1711,7 @@
           <a:p>
             <a:fld id="{78C97017-6FC3-485B-9764-EAC9E56C1D49}" type="datetimeFigureOut">
               <a:rPr lang="en-US" smtClean="0"/>
-              <a:t>10/16/2016</a:t>
+              <a:t>4/8/17</a:t>
             </a:fld>
             <a:endParaRPr lang="en-US"/>
           </a:p>
@@ -2117,7 +2133,7 @@
           <a:p>
             <a:fld id="{78C97017-6FC3-485B-9764-EAC9E56C1D49}" type="datetimeFigureOut">
               <a:rPr lang="en-US" smtClean="0"/>
-              <a:t>10/16/2016</a:t>
+              <a:t>4/8/17</a:t>
             </a:fld>
             <a:endParaRPr lang="en-US"/>
           </a:p>
@@ -2235,7 +2251,7 @@
           <a:p>
             <a:fld id="{78C97017-6FC3-485B-9764-EAC9E56C1D49}" type="datetimeFigureOut">
               <a:rPr lang="en-US" smtClean="0"/>
-              <a:t>10/16/2016</a:t>
+              <a:t>4/8/17</a:t>
             </a:fld>
             <a:endParaRPr lang="en-US"/>
           </a:p>
@@ -2330,7 +2346,7 @@
           <a:p>
             <a:fld id="{78C97017-6FC3-485B-9764-EAC9E56C1D49}" type="datetimeFigureOut">
               <a:rPr lang="en-US" smtClean="0"/>
-              <a:t>10/16/2016</a:t>
+              <a:t>4/8/17</a:t>
             </a:fld>
             <a:endParaRPr lang="en-US"/>
           </a:p>
@@ -2607,7 +2623,7 @@
           <a:p>
             <a:fld id="{78C97017-6FC3-485B-9764-EAC9E56C1D49}" type="datetimeFigureOut">
               <a:rPr lang="en-US" smtClean="0"/>
-              <a:t>10/16/2016</a:t>
+              <a:t>4/8/17</a:t>
             </a:fld>
             <a:endParaRPr lang="en-US"/>
           </a:p>
@@ -2860,7 +2876,7 @@
           <a:p>
             <a:fld id="{78C97017-6FC3-485B-9764-EAC9E56C1D49}" type="datetimeFigureOut">
               <a:rPr lang="en-US" smtClean="0"/>
-              <a:t>10/16/2016</a:t>
+              <a:t>4/8/17</a:t>
             </a:fld>
             <a:endParaRPr lang="en-US"/>
           </a:p>
@@ -3073,7 +3089,7 @@
           <a:p>
             <a:fld id="{78C97017-6FC3-485B-9764-EAC9E56C1D49}" type="datetimeFigureOut">
               <a:rPr lang="en-US" smtClean="0"/>
-              <a:t>10/16/2016</a:t>
+              <a:t>4/8/17</a:t>
             </a:fld>
             <a:endParaRPr lang="en-US"/>
           </a:p>
@@ -4310,7 +4326,7 @@
                   <a:srgbClr val="7030A0"/>
                 </a:solidFill>
               </a:rPr>
-              <a:t>deletePerson</a:t>
+              <a:t>deleteTask</a:t>
             </a:r>
             <a:r>
               <a:rPr lang="en-US" sz="1400" dirty="0" smtClean="0">
@@ -4318,7 +4334,15 @@
                   <a:srgbClr val="7030A0"/>
                 </a:solidFill>
               </a:rPr>
-              <a:t>(p)</a:t>
+              <a:t>(p</a:t>
+            </a:r>
+            <a:r>
+              <a:rPr lang="en-US" sz="1400" dirty="0" smtClean="0">
+                <a:solidFill>
+                  <a:srgbClr val="7030A0"/>
+                </a:solidFill>
+              </a:rPr>
+              <a:t>)</a:t>
             </a:r>
             <a:endParaRPr lang="en-US" sz="1400" dirty="0">
               <a:solidFill>
@@ -4368,7 +4392,7 @@
                   </a:schemeClr>
                 </a:solidFill>
               </a:rPr>
-              <a:t>AddressBookChangedEvent</a:t>
+              <a:t>TaskManagerChangedEvent</a:t>
             </a:r>
             <a:r>
               <a:rPr lang="en-US" sz="1400" dirty="0" smtClean="0">
@@ -4942,7 +4966,7 @@
                   </a:schemeClr>
                 </a:solidFill>
               </a:rPr>
-              <a:t>AddressBookChangedEvent</a:t>
+              <a:t>TaskManagerChangedEvent</a:t>
             </a:r>
             <a:r>
               <a:rPr lang="en-US" sz="1400" dirty="0" smtClean="0">
@@ -5314,7 +5338,7 @@
                   </a:schemeClr>
                 </a:solidFill>
               </a:rPr>
-              <a:t>handleAddresssBookChangedEvent</a:t>
+              <a:t>handleTaskManagerChangedEvent</a:t>
             </a:r>
             <a:r>
               <a:rPr lang="en-US" sz="1400" dirty="0" smtClean="0">
@@ -5625,7 +5649,7 @@
                   <a:srgbClr val="00B050"/>
                 </a:solidFill>
               </a:rPr>
-              <a:t>handleAddresssBookChangedEvent</a:t>
+              <a:t>handleTaskManagerChangedEvent</a:t>
             </a:r>
             <a:r>
               <a:rPr lang="en-US" sz="1400" dirty="0" smtClean="0">

</xml_diff>

<commit_message>
Add tests for TimeParserSelector
</commit_message>
<xml_diff>
--- a/docs/diagrams/HighLevelSequenceDiagrams.pptx
+++ b/docs/diagrams/HighLevelSequenceDiagrams.pptx
@@ -175,7 +175,7 @@
             </a:lvl1pPr>
           </a:lstStyle>
           <a:p>
-            <a:endParaRPr lang="en-US"/>
+            <a:endParaRPr lang="en-US" dirty="0"/>
           </a:p>
         </p:txBody>
       </p:sp>
@@ -210,7 +210,7 @@
               <a:rPr lang="en-US" smtClean="0"/>
               <a:t>4/8/17</a:t>
             </a:fld>
-            <a:endParaRPr lang="en-US"/>
+            <a:endParaRPr lang="en-US" dirty="0"/>
           </a:p>
         </p:txBody>
       </p:sp>
@@ -243,7 +243,7 @@
           <a:bodyPr vert="horz" lIns="91440" tIns="45720" rIns="91440" bIns="45720" rtlCol="0" anchor="ctr"/>
           <a:lstStyle/>
           <a:p>
-            <a:endParaRPr lang="en-US"/>
+            <a:endParaRPr lang="en-US" dirty="0"/>
           </a:p>
         </p:txBody>
       </p:sp>
@@ -334,7 +334,7 @@
             </a:lvl1pPr>
           </a:lstStyle>
           <a:p>
-            <a:endParaRPr lang="en-US"/>
+            <a:endParaRPr lang="en-US" dirty="0"/>
           </a:p>
         </p:txBody>
       </p:sp>
@@ -369,7 +369,7 @@
               <a:rPr lang="en-US" smtClean="0"/>
               <a:t>‹#›</a:t>
             </a:fld>
-            <a:endParaRPr lang="en-US"/>
+            <a:endParaRPr lang="en-US" dirty="0"/>
           </a:p>
         </p:txBody>
       </p:sp>
@@ -659,7 +659,7 @@
               <a:rPr lang="en-US" smtClean="0"/>
               <a:t>4/8/17</a:t>
             </a:fld>
-            <a:endParaRPr lang="en-US"/>
+            <a:endParaRPr lang="en-US" dirty="0"/>
           </a:p>
         </p:txBody>
       </p:sp>
@@ -678,7 +678,7 @@
           <a:bodyPr/>
           <a:lstStyle/>
           <a:p>
-            <a:endParaRPr lang="en-US"/>
+            <a:endParaRPr lang="en-US" dirty="0"/>
           </a:p>
         </p:txBody>
       </p:sp>
@@ -701,7 +701,7 @@
               <a:rPr lang="en-US" smtClean="0"/>
               <a:t>‹#›</a:t>
             </a:fld>
-            <a:endParaRPr lang="en-US"/>
+            <a:endParaRPr lang="en-US" dirty="0"/>
           </a:p>
         </p:txBody>
       </p:sp>
@@ -829,7 +829,7 @@
               <a:rPr lang="en-US" smtClean="0"/>
               <a:t>4/8/17</a:t>
             </a:fld>
-            <a:endParaRPr lang="en-US"/>
+            <a:endParaRPr lang="en-US" dirty="0"/>
           </a:p>
         </p:txBody>
       </p:sp>
@@ -848,7 +848,7 @@
           <a:bodyPr/>
           <a:lstStyle/>
           <a:p>
-            <a:endParaRPr lang="en-US"/>
+            <a:endParaRPr lang="en-US" dirty="0"/>
           </a:p>
         </p:txBody>
       </p:sp>
@@ -871,7 +871,7 @@
               <a:rPr lang="en-US" smtClean="0"/>
               <a:t>‹#›</a:t>
             </a:fld>
-            <a:endParaRPr lang="en-US"/>
+            <a:endParaRPr lang="en-US" dirty="0"/>
           </a:p>
         </p:txBody>
       </p:sp>
@@ -1009,7 +1009,7 @@
               <a:rPr lang="en-US" smtClean="0"/>
               <a:t>4/8/17</a:t>
             </a:fld>
-            <a:endParaRPr lang="en-US"/>
+            <a:endParaRPr lang="en-US" dirty="0"/>
           </a:p>
         </p:txBody>
       </p:sp>
@@ -1028,7 +1028,7 @@
           <a:bodyPr/>
           <a:lstStyle/>
           <a:p>
-            <a:endParaRPr lang="en-US"/>
+            <a:endParaRPr lang="en-US" dirty="0"/>
           </a:p>
         </p:txBody>
       </p:sp>
@@ -1051,7 +1051,7 @@
               <a:rPr lang="en-US" smtClean="0"/>
               <a:t>‹#›</a:t>
             </a:fld>
-            <a:endParaRPr lang="en-US"/>
+            <a:endParaRPr lang="en-US" dirty="0"/>
           </a:p>
         </p:txBody>
       </p:sp>
@@ -1179,7 +1179,7 @@
               <a:rPr lang="en-US" smtClean="0"/>
               <a:t>4/8/17</a:t>
             </a:fld>
-            <a:endParaRPr lang="en-US"/>
+            <a:endParaRPr lang="en-US" dirty="0"/>
           </a:p>
         </p:txBody>
       </p:sp>
@@ -1198,7 +1198,7 @@
           <a:bodyPr/>
           <a:lstStyle/>
           <a:p>
-            <a:endParaRPr lang="en-US"/>
+            <a:endParaRPr lang="en-US" dirty="0"/>
           </a:p>
         </p:txBody>
       </p:sp>
@@ -1221,7 +1221,7 @@
               <a:rPr lang="en-US" smtClean="0"/>
               <a:t>‹#›</a:t>
             </a:fld>
-            <a:endParaRPr lang="en-US"/>
+            <a:endParaRPr lang="en-US" dirty="0"/>
           </a:p>
         </p:txBody>
       </p:sp>
@@ -1425,7 +1425,7 @@
               <a:rPr lang="en-US" smtClean="0"/>
               <a:t>4/8/17</a:t>
             </a:fld>
-            <a:endParaRPr lang="en-US"/>
+            <a:endParaRPr lang="en-US" dirty="0"/>
           </a:p>
         </p:txBody>
       </p:sp>
@@ -1444,7 +1444,7 @@
           <a:bodyPr/>
           <a:lstStyle/>
           <a:p>
-            <a:endParaRPr lang="en-US"/>
+            <a:endParaRPr lang="en-US" dirty="0"/>
           </a:p>
         </p:txBody>
       </p:sp>
@@ -1467,7 +1467,7 @@
               <a:rPr lang="en-US" smtClean="0"/>
               <a:t>‹#›</a:t>
             </a:fld>
-            <a:endParaRPr lang="en-US"/>
+            <a:endParaRPr lang="en-US" dirty="0"/>
           </a:p>
         </p:txBody>
       </p:sp>
@@ -1713,7 +1713,7 @@
               <a:rPr lang="en-US" smtClean="0"/>
               <a:t>4/8/17</a:t>
             </a:fld>
-            <a:endParaRPr lang="en-US"/>
+            <a:endParaRPr lang="en-US" dirty="0"/>
           </a:p>
         </p:txBody>
       </p:sp>
@@ -1732,7 +1732,7 @@
           <a:bodyPr/>
           <a:lstStyle/>
           <a:p>
-            <a:endParaRPr lang="en-US"/>
+            <a:endParaRPr lang="en-US" dirty="0"/>
           </a:p>
         </p:txBody>
       </p:sp>
@@ -1755,7 +1755,7 @@
               <a:rPr lang="en-US" smtClean="0"/>
               <a:t>‹#›</a:t>
             </a:fld>
-            <a:endParaRPr lang="en-US"/>
+            <a:endParaRPr lang="en-US" dirty="0"/>
           </a:p>
         </p:txBody>
       </p:sp>
@@ -2135,7 +2135,7 @@
               <a:rPr lang="en-US" smtClean="0"/>
               <a:t>4/8/17</a:t>
             </a:fld>
-            <a:endParaRPr lang="en-US"/>
+            <a:endParaRPr lang="en-US" dirty="0"/>
           </a:p>
         </p:txBody>
       </p:sp>
@@ -2154,7 +2154,7 @@
           <a:bodyPr/>
           <a:lstStyle/>
           <a:p>
-            <a:endParaRPr lang="en-US"/>
+            <a:endParaRPr lang="en-US" dirty="0"/>
           </a:p>
         </p:txBody>
       </p:sp>
@@ -2177,7 +2177,7 @@
               <a:rPr lang="en-US" smtClean="0"/>
               <a:t>‹#›</a:t>
             </a:fld>
-            <a:endParaRPr lang="en-US"/>
+            <a:endParaRPr lang="en-US" dirty="0"/>
           </a:p>
         </p:txBody>
       </p:sp>
@@ -2253,7 +2253,7 @@
               <a:rPr lang="en-US" smtClean="0"/>
               <a:t>4/8/17</a:t>
             </a:fld>
-            <a:endParaRPr lang="en-US"/>
+            <a:endParaRPr lang="en-US" dirty="0"/>
           </a:p>
         </p:txBody>
       </p:sp>
@@ -2272,7 +2272,7 @@
           <a:bodyPr/>
           <a:lstStyle/>
           <a:p>
-            <a:endParaRPr lang="en-US"/>
+            <a:endParaRPr lang="en-US" dirty="0"/>
           </a:p>
         </p:txBody>
       </p:sp>
@@ -2295,7 +2295,7 @@
               <a:rPr lang="en-US" smtClean="0"/>
               <a:t>‹#›</a:t>
             </a:fld>
-            <a:endParaRPr lang="en-US"/>
+            <a:endParaRPr lang="en-US" dirty="0"/>
           </a:p>
         </p:txBody>
       </p:sp>
@@ -2348,7 +2348,7 @@
               <a:rPr lang="en-US" smtClean="0"/>
               <a:t>4/8/17</a:t>
             </a:fld>
-            <a:endParaRPr lang="en-US"/>
+            <a:endParaRPr lang="en-US" dirty="0"/>
           </a:p>
         </p:txBody>
       </p:sp>
@@ -2367,7 +2367,7 @@
           <a:bodyPr/>
           <a:lstStyle/>
           <a:p>
-            <a:endParaRPr lang="en-US"/>
+            <a:endParaRPr lang="en-US" dirty="0"/>
           </a:p>
         </p:txBody>
       </p:sp>
@@ -2390,7 +2390,7 @@
               <a:rPr lang="en-US" smtClean="0"/>
               <a:t>‹#›</a:t>
             </a:fld>
-            <a:endParaRPr lang="en-US"/>
+            <a:endParaRPr lang="en-US" dirty="0"/>
           </a:p>
         </p:txBody>
       </p:sp>
@@ -2625,7 +2625,7 @@
               <a:rPr lang="en-US" smtClean="0"/>
               <a:t>4/8/17</a:t>
             </a:fld>
-            <a:endParaRPr lang="en-US"/>
+            <a:endParaRPr lang="en-US" dirty="0"/>
           </a:p>
         </p:txBody>
       </p:sp>
@@ -2644,7 +2644,7 @@
           <a:bodyPr/>
           <a:lstStyle/>
           <a:p>
-            <a:endParaRPr lang="en-US"/>
+            <a:endParaRPr lang="en-US" dirty="0"/>
           </a:p>
         </p:txBody>
       </p:sp>
@@ -2667,7 +2667,7 @@
               <a:rPr lang="en-US" smtClean="0"/>
               <a:t>‹#›</a:t>
             </a:fld>
-            <a:endParaRPr lang="en-US"/>
+            <a:endParaRPr lang="en-US" dirty="0"/>
           </a:p>
         </p:txBody>
       </p:sp>
@@ -2790,7 +2790,7 @@
             </a:lvl9pPr>
           </a:lstStyle>
           <a:p>
-            <a:endParaRPr lang="en-US"/>
+            <a:endParaRPr lang="en-US" dirty="0"/>
           </a:p>
         </p:txBody>
       </p:sp>
@@ -2878,7 +2878,7 @@
               <a:rPr lang="en-US" smtClean="0"/>
               <a:t>4/8/17</a:t>
             </a:fld>
-            <a:endParaRPr lang="en-US"/>
+            <a:endParaRPr lang="en-US" dirty="0"/>
           </a:p>
         </p:txBody>
       </p:sp>
@@ -2897,7 +2897,7 @@
           <a:bodyPr/>
           <a:lstStyle/>
           <a:p>
-            <a:endParaRPr lang="en-US"/>
+            <a:endParaRPr lang="en-US" dirty="0"/>
           </a:p>
         </p:txBody>
       </p:sp>
@@ -2920,7 +2920,7 @@
               <a:rPr lang="en-US" smtClean="0"/>
               <a:t>‹#›</a:t>
             </a:fld>
-            <a:endParaRPr lang="en-US"/>
+            <a:endParaRPr lang="en-US" dirty="0"/>
           </a:p>
         </p:txBody>
       </p:sp>
@@ -3091,7 +3091,7 @@
               <a:rPr lang="en-US" smtClean="0"/>
               <a:t>4/8/17</a:t>
             </a:fld>
-            <a:endParaRPr lang="en-US"/>
+            <a:endParaRPr lang="en-US" dirty="0"/>
           </a:p>
         </p:txBody>
       </p:sp>
@@ -3128,7 +3128,7 @@
             </a:lvl1pPr>
           </a:lstStyle>
           <a:p>
-            <a:endParaRPr lang="en-US"/>
+            <a:endParaRPr lang="en-US" dirty="0"/>
           </a:p>
         </p:txBody>
       </p:sp>
@@ -3169,7 +3169,7 @@
               <a:rPr lang="en-US" smtClean="0"/>
               <a:t>‹#›</a:t>
             </a:fld>
-            <a:endParaRPr lang="en-US"/>
+            <a:endParaRPr lang="en-US" dirty="0"/>
           </a:p>
         </p:txBody>
       </p:sp>
@@ -3603,7 +3603,7 @@
           <a:lstStyle/>
           <a:p>
             <a:pPr algn="ctr"/>
-            <a:endParaRPr lang="en-SG" sz="1400">
+            <a:endParaRPr lang="en-SG" sz="1400" dirty="0">
               <a:solidFill>
                 <a:schemeClr val="dk1"/>
               </a:solidFill>
@@ -3670,7 +3670,7 @@
             <a:lstStyle/>
             <a:p>
               <a:pPr algn="ctr"/>
-              <a:endParaRPr lang="en-SG"/>
+              <a:endParaRPr lang="en-SG" dirty="0"/>
             </a:p>
           </p:txBody>
         </p:sp>
@@ -3787,7 +3787,7 @@
             <a:lstStyle/>
             <a:p>
               <a:pPr algn="ctr"/>
-              <a:endParaRPr lang="en-SG"/>
+              <a:endParaRPr lang="en-SG" dirty="0"/>
             </a:p>
           </p:txBody>
         </p:sp>
@@ -3967,7 +3967,7 @@
           <a:lstStyle/>
           <a:p>
             <a:pPr algn="ctr"/>
-            <a:endParaRPr lang="en-SG" sz="1400">
+            <a:endParaRPr lang="en-SG" sz="1400" dirty="0">
               <a:solidFill>
                 <a:schemeClr val="dk1"/>
               </a:solidFill>
@@ -4114,7 +4114,7 @@
           <a:lstStyle/>
           <a:p>
             <a:pPr algn="ctr"/>
-            <a:endParaRPr lang="en-SG" sz="1400">
+            <a:endParaRPr lang="en-SG" sz="1400" dirty="0">
               <a:solidFill>
                 <a:schemeClr val="dk1"/>
               </a:solidFill>
@@ -4321,20 +4321,12 @@
           <a:lstStyle/>
           <a:p>
             <a:r>
-              <a:rPr lang="en-US" sz="1400" dirty="0" err="1" smtClean="0">
-                <a:solidFill>
-                  <a:srgbClr val="7030A0"/>
-                </a:solidFill>
-              </a:rPr>
-              <a:t>deleteTask</a:t>
-            </a:r>
-            <a:r>
               <a:rPr lang="en-US" sz="1400" dirty="0" smtClean="0">
                 <a:solidFill>
                   <a:srgbClr val="7030A0"/>
                 </a:solidFill>
               </a:rPr>
-              <a:t>(p</a:t>
+              <a:t>deleteTask(p</a:t>
             </a:r>
             <a:r>
               <a:rPr lang="en-US" sz="1400" dirty="0" smtClean="0">
@@ -4382,17 +4374,7 @@
                   </a:schemeClr>
                 </a:solidFill>
               </a:rPr>
-              <a:t>post(</a:t>
-            </a:r>
-            <a:r>
-              <a:rPr lang="en-US" sz="1400" dirty="0" err="1" smtClean="0">
-                <a:solidFill>
-                  <a:schemeClr val="accent5">
-                    <a:lumMod val="75000"/>
-                  </a:schemeClr>
-                </a:solidFill>
-              </a:rPr>
-              <a:t>TaskManagerChangedEvent</a:t>
+              <a:t>post(TaskManagerChangedEvent</a:t>
             </a:r>
             <a:r>
               <a:rPr lang="en-US" sz="1400" dirty="0" smtClean="0">
@@ -4581,15 +4563,7 @@
                   <a:schemeClr val="bg1"/>
                 </a:solidFill>
               </a:rPr>
-              <a:t>:</a:t>
-            </a:r>
-            <a:r>
-              <a:rPr lang="en-US" sz="1600" dirty="0" err="1" smtClean="0">
-                <a:solidFill>
-                  <a:schemeClr val="bg1"/>
-                </a:solidFill>
-              </a:rPr>
-              <a:t>EventsCenter</a:t>
+              <a:t>:EventsCenter</a:t>
             </a:r>
             <a:endParaRPr lang="en-SG" sz="1600" dirty="0">
               <a:solidFill>
@@ -4685,7 +4659,7 @@
           <a:lstStyle/>
           <a:p>
             <a:pPr algn="ctr"/>
-            <a:endParaRPr lang="en-SG" sz="1400">
+            <a:endParaRPr lang="en-SG" sz="1400" dirty="0">
               <a:solidFill>
                 <a:schemeClr val="dk1"/>
               </a:solidFill>
@@ -4918,7 +4892,7 @@
           <a:lstStyle/>
           <a:p>
             <a:pPr algn="ctr"/>
-            <a:endParaRPr lang="en-SG" sz="1400">
+            <a:endParaRPr lang="en-SG" sz="1400" dirty="0">
               <a:solidFill>
                 <a:schemeClr val="dk1"/>
               </a:solidFill>
@@ -4956,17 +4930,7 @@
                   </a:schemeClr>
                 </a:solidFill>
               </a:rPr>
-              <a:t>post(</a:t>
-            </a:r>
-            <a:r>
-              <a:rPr lang="en-US" sz="1400" dirty="0" err="1" smtClean="0">
-                <a:solidFill>
-                  <a:schemeClr val="accent5">
-                    <a:lumMod val="75000"/>
-                  </a:schemeClr>
-                </a:solidFill>
-              </a:rPr>
-              <a:t>TaskManagerChangedEvent</a:t>
+              <a:t>post(TaskManagerChangedEvent</a:t>
             </a:r>
             <a:r>
               <a:rPr lang="en-US" sz="1400" dirty="0" smtClean="0">
@@ -5081,15 +5045,7 @@
                   <a:schemeClr val="bg1"/>
                 </a:solidFill>
               </a:rPr>
-              <a:t>:</a:t>
-            </a:r>
-            <a:r>
-              <a:rPr lang="en-US" sz="1600" dirty="0" err="1" smtClean="0">
-                <a:solidFill>
-                  <a:schemeClr val="bg1"/>
-                </a:solidFill>
-              </a:rPr>
-              <a:t>EventsCenter</a:t>
+              <a:t>:EventsCenter</a:t>
             </a:r>
             <a:endParaRPr lang="en-SG" sz="1600" dirty="0">
               <a:solidFill>
@@ -5185,7 +5141,7 @@
           <a:lstStyle/>
           <a:p>
             <a:pPr algn="ctr"/>
-            <a:endParaRPr lang="en-SG" sz="1400">
+            <a:endParaRPr lang="en-SG" sz="1400" dirty="0">
               <a:solidFill>
                 <a:schemeClr val="dk1"/>
               </a:solidFill>
@@ -5331,7 +5287,7 @@
           <a:lstStyle/>
           <a:p>
             <a:r>
-              <a:rPr lang="en-US" sz="1400" dirty="0" err="1" smtClean="0">
+              <a:rPr lang="en-US" sz="1400" dirty="0" smtClean="0">
                 <a:solidFill>
                   <a:schemeClr val="accent6">
                     <a:lumMod val="75000"/>
@@ -5536,7 +5492,7 @@
           <a:lstStyle/>
           <a:p>
             <a:pPr algn="ctr"/>
-            <a:endParaRPr lang="en-SG" sz="1400">
+            <a:endParaRPr lang="en-SG" sz="1400" dirty="0">
               <a:solidFill>
                 <a:schemeClr val="dk1"/>
               </a:solidFill>
@@ -5644,7 +5600,7 @@
           <a:lstStyle/>
           <a:p>
             <a:r>
-              <a:rPr lang="en-US" sz="1400" dirty="0" err="1" smtClean="0">
+              <a:rPr lang="en-US" sz="1400" dirty="0" smtClean="0">
                 <a:solidFill>
                   <a:srgbClr val="00B050"/>
                 </a:solidFill>
@@ -5770,7 +5726,7 @@
             <a:lstStyle/>
             <a:p>
               <a:pPr algn="ctr"/>
-              <a:endParaRPr lang="en-SG"/>
+              <a:endParaRPr lang="en-SG" dirty="0"/>
             </a:p>
           </p:txBody>
         </p:sp>
@@ -5817,7 +5773,7 @@
             <a:lstStyle/>
             <a:p>
               <a:pPr algn="ctr"/>
-              <a:endParaRPr lang="en-SG" sz="1400">
+              <a:endParaRPr lang="en-SG" sz="1400" dirty="0">
                 <a:solidFill>
                   <a:schemeClr val="dk1"/>
                 </a:solidFill>
@@ -5970,7 +5926,7 @@
             <a:lstStyle/>
             <a:p>
               <a:pPr algn="ctr"/>
-              <a:endParaRPr lang="en-SG"/>
+              <a:endParaRPr lang="en-SG" dirty="0"/>
             </a:p>
           </p:txBody>
         </p:sp>
@@ -6019,7 +5975,7 @@
             <a:lstStyle/>
             <a:p>
               <a:pPr algn="ctr"/>
-              <a:endParaRPr lang="en-SG" sz="1400">
+              <a:endParaRPr lang="en-SG" sz="1400" dirty="0">
                 <a:solidFill>
                   <a:schemeClr val="dk1"/>
                 </a:solidFill>

</xml_diff>